<commit_message>
Update applications of summary
</commit_message>
<xml_diff>
--- a/presentations/Summary.pptx
+++ b/presentations/Summary.pptx
@@ -299,7 +299,7 @@
           <a:p>
             <a:fld id="{F2853615-BFDE-46DE-814C-47EC6EF6D371}" type="datetimeFigureOut">
               <a:rPr lang="el-GR" smtClean="0"/>
-              <a:t>15/6/2018</a:t>
+              <a:t>1/6/2019</a:t>
             </a:fld>
             <a:endParaRPr lang="el-GR"/>
           </a:p>
@@ -499,7 +499,7 @@
           <a:p>
             <a:fld id="{F2853615-BFDE-46DE-814C-47EC6EF6D371}" type="datetimeFigureOut">
               <a:rPr lang="el-GR" smtClean="0"/>
-              <a:t>15/6/2018</a:t>
+              <a:t>1/6/2019</a:t>
             </a:fld>
             <a:endParaRPr lang="el-GR"/>
           </a:p>
@@ -674,7 +674,7 @@
           <a:p>
             <a:fld id="{F2853615-BFDE-46DE-814C-47EC6EF6D371}" type="datetimeFigureOut">
               <a:rPr lang="el-GR" smtClean="0"/>
-              <a:t>15/6/2018</a:t>
+              <a:t>1/6/2019</a:t>
             </a:fld>
             <a:endParaRPr lang="el-GR"/>
           </a:p>
@@ -839,7 +839,7 @@
           <a:p>
             <a:fld id="{F2853615-BFDE-46DE-814C-47EC6EF6D371}" type="datetimeFigureOut">
               <a:rPr lang="el-GR" smtClean="0"/>
-              <a:t>15/6/2018</a:t>
+              <a:t>1/6/2019</a:t>
             </a:fld>
             <a:endParaRPr lang="el-GR"/>
           </a:p>
@@ -978,7 +978,7 @@
           <a:p>
             <a:fld id="{F2853615-BFDE-46DE-814C-47EC6EF6D371}" type="datetimeFigureOut">
               <a:rPr lang="el-GR" smtClean="0"/>
-              <a:t>15/6/2018</a:t>
+              <a:t>1/6/2019</a:t>
             </a:fld>
             <a:endParaRPr lang="el-GR"/>
           </a:p>
@@ -1296,7 +1296,7 @@
           <a:p>
             <a:fld id="{F2853615-BFDE-46DE-814C-47EC6EF6D371}" type="datetimeFigureOut">
               <a:rPr lang="el-GR" smtClean="0"/>
-              <a:t>15/6/2018</a:t>
+              <a:t>1/6/2019</a:t>
             </a:fld>
             <a:endParaRPr lang="el-GR"/>
           </a:p>
@@ -1762,7 +1762,7 @@
           <a:p>
             <a:fld id="{F2853615-BFDE-46DE-814C-47EC6EF6D371}" type="datetimeFigureOut">
               <a:rPr lang="el-GR" smtClean="0"/>
-              <a:t>15/6/2018</a:t>
+              <a:t>1/6/2019</a:t>
             </a:fld>
             <a:endParaRPr lang="el-GR"/>
           </a:p>
@@ -1910,7 +1910,7 @@
           <a:p>
             <a:fld id="{F2853615-BFDE-46DE-814C-47EC6EF6D371}" type="datetimeFigureOut">
               <a:rPr lang="el-GR" smtClean="0"/>
-              <a:t>15/6/2018</a:t>
+              <a:t>1/6/2019</a:t>
             </a:fld>
             <a:endParaRPr lang="el-GR"/>
           </a:p>
@@ -2000,7 +2000,7 @@
           <a:p>
             <a:fld id="{F2853615-BFDE-46DE-814C-47EC6EF6D371}" type="datetimeFigureOut">
               <a:rPr lang="el-GR" smtClean="0"/>
-              <a:t>15/6/2018</a:t>
+              <a:t>1/6/2019</a:t>
             </a:fld>
             <a:endParaRPr lang="el-GR"/>
           </a:p>
@@ -2274,7 +2274,7 @@
           <a:p>
             <a:fld id="{F2853615-BFDE-46DE-814C-47EC6EF6D371}" type="datetimeFigureOut">
               <a:rPr lang="el-GR" smtClean="0"/>
-              <a:t>15/6/2018</a:t>
+              <a:t>1/6/2019</a:t>
             </a:fld>
             <a:endParaRPr lang="el-GR"/>
           </a:p>
@@ -2579,7 +2579,7 @@
           <a:p>
             <a:fld id="{F2853615-BFDE-46DE-814C-47EC6EF6D371}" type="datetimeFigureOut">
               <a:rPr lang="el-GR" smtClean="0"/>
-              <a:t>15/6/2018</a:t>
+              <a:t>1/6/2019</a:t>
             </a:fld>
             <a:endParaRPr lang="el-GR"/>
           </a:p>
@@ -2877,7 +2877,7 @@
           <a:p>
             <a:fld id="{F2853615-BFDE-46DE-814C-47EC6EF6D371}" type="datetimeFigureOut">
               <a:rPr lang="el-GR" smtClean="0"/>
-              <a:t>15/6/2018</a:t>
+              <a:t>1/6/2019</a:t>
             </a:fld>
             <a:endParaRPr lang="el-GR"/>
           </a:p>
@@ -3986,8 +3986,8 @@
         </p:nvSpPr>
         <p:spPr>
           <a:xfrm>
-            <a:off x="529469" y="4904000"/>
-            <a:ext cx="8099577" cy="1477328"/>
+            <a:off x="529469" y="4840132"/>
+            <a:ext cx="8099577" cy="1754326"/>
           </a:xfrm>
           <a:prstGeom prst="rect">
             <a:avLst/>
@@ -4006,9 +4006,24 @@
           </a:p>
           <a:p>
             <a:r>
+              <a:rPr lang="en-GB" dirty="0" smtClean="0"/>
+              <a:t>- https</a:t>
+            </a:r>
+            <a:r>
               <a:rPr lang="en-GB" dirty="0"/>
-              <a:t>- https://www.youtube.com/watch?v=V1eYniJ0Rnk</a:t>
-            </a:r>
+              <a:t>://</a:t>
+            </a:r>
+            <a:r>
+              <a:rPr lang="en-GB" dirty="0" smtClean="0"/>
+              <a:t>www.youtube.com/watch?v=V1eYniJ0Rnk</a:t>
+            </a:r>
+          </a:p>
+          <a:p>
+            <a:r>
+              <a:rPr lang="en-GB" dirty="0"/>
+              <a:t>- https://experiments.withgoogle.com/collection/ai</a:t>
+            </a:r>
+            <a:endParaRPr lang="en-GB" dirty="0"/>
           </a:p>
           <a:p>
             <a:r>

</xml_diff>